<commit_message>
Added TCP/IP scripts and HTTP lectures
</commit_message>
<xml_diff>
--- a/http_requests/Python_8_HTTP.pptx
+++ b/http_requests/Python_8_HTTP.pptx
@@ -256,7 +256,7 @@
             <a:fld id="{EA9F7FF7-50CD-D74F-8521-E72DB68B670C}" type="datetimeFigureOut">
               <a:rPr lang="en-US" smtClean="0"/>
               <a:pPr/>
-              <a:t>2/6/21</a:t>
+              <a:t>5/21/21</a:t>
             </a:fld>
             <a:endParaRPr lang="en-US"/>
           </a:p>
@@ -424,7 +424,7 @@
             <a:fld id="{9DD1DD9B-E140-4D76-B427-DF4838D859EA}" type="datetimeFigureOut">
               <a:rPr lang="en-US" smtClean="0"/>
               <a:pPr/>
-              <a:t>2/6/21</a:t>
+              <a:t>5/21/21</a:t>
             </a:fld>
             <a:endParaRPr lang="en-US"/>
           </a:p>

</xml_diff>